<commit_message>
Trends re-calculated based on precise data
</commit_message>
<xml_diff>
--- a/TOG/TOG-main.pptx
+++ b/TOG/TOG-main.pptx
@@ -2,7 +2,7 @@
 <file path=ppt/presentation.xml><?xml version="1.0" encoding="utf-8"?>
 <p:presentation xmlns:a="http://schemas.openxmlformats.org/drawingml/2006/main" xmlns:r="http://schemas.openxmlformats.org/officeDocument/2006/relationships" xmlns:p="http://schemas.openxmlformats.org/presentationml/2006/main" saveSubsetFonts="1">
   <p:sldMasterIdLst>
-    <p:sldMasterId id="2147483684" r:id="rId1"/>
+    <p:sldMasterId id="2147483696" r:id="rId1"/>
   </p:sldMasterIdLst>
   <p:notesMasterIdLst>
     <p:notesMasterId r:id="rId3"/>
@@ -10,7 +10,7 @@
   <p:sldIdLst>
     <p:sldId id="257" r:id="rId2"/>
   </p:sldIdLst>
-  <p:sldSz cx="10113963" cy="5194300"/>
+  <p:sldSz cx="9647238" cy="5194300"/>
   <p:notesSz cx="6858000" cy="9144000"/>
   <p:defaultTextStyle>
     <a:defPPr>
@@ -186,7 +186,7 @@
             <c:bubble3D val="0"/>
             <c:extLst>
               <c:ext xmlns:c16="http://schemas.microsoft.com/office/drawing/2014/chart" uri="{C3380CC4-5D6E-409C-BE32-E72D297353CC}">
-                <c16:uniqueId val="{00000000-9B68-054A-86DD-47481C5F2381}"/>
+                <c16:uniqueId val="{00000000-7290-DC4F-BB3F-2748F6A3DBED}"/>
               </c:ext>
             </c:extLst>
           </c:dPt>
@@ -213,7 +213,7 @@
             <c:bubble3D val="0"/>
             <c:extLst>
               <c:ext xmlns:c16="http://schemas.microsoft.com/office/drawing/2014/chart" uri="{C3380CC4-5D6E-409C-BE32-E72D297353CC}">
-                <c16:uniqueId val="{00000001-9B68-054A-86DD-47481C5F2381}"/>
+                <c16:uniqueId val="{00000001-7290-DC4F-BB3F-2748F6A3DBED}"/>
               </c:ext>
             </c:extLst>
           </c:dPt>
@@ -225,7 +225,7 @@
                   <a:bodyPr/>
                   <a:lstStyle/>
                   <a:p>
-                    <a:fld id="{4848828A-479F-AF44-B55B-C567DD6B78A8}" type="CELLRANGE">
+                    <a:fld id="{CA5E2D1D-A292-904D-9D29-DA741346C491}" type="CELLRANGE">
                       <a:rPr lang="en-US"/>
                       <a:pPr/>
                       <a:t>[CELLRANGE]</a:t>
@@ -248,7 +248,7 @@
                   <c15:showDataLabelsRange val="1"/>
                 </c:ext>
                 <c:ext xmlns:c16="http://schemas.microsoft.com/office/drawing/2014/chart" uri="{C3380CC4-5D6E-409C-BE32-E72D297353CC}">
-                  <c16:uniqueId val="{00000002-9B68-054A-86DD-47481C5F2381}"/>
+                  <c16:uniqueId val="{00000002-7290-DC4F-BB3F-2748F6A3DBED}"/>
                 </c:ext>
               </c:extLst>
             </c:dLbl>
@@ -259,7 +259,7 @@
                   <a:bodyPr/>
                   <a:lstStyle/>
                   <a:p>
-                    <a:fld id="{B0632698-82F3-2349-8224-D4FB36DB4D5B}" type="CELLRANGE">
+                    <a:fld id="{D8AC8B81-7EB9-6143-91F7-828F3260806A}" type="CELLRANGE">
                       <a:rPr lang="en-US"/>
                       <a:pPr/>
                       <a:t>[CELLRANGE]</a:t>
@@ -282,7 +282,7 @@
                   <c15:showDataLabelsRange val="1"/>
                 </c:ext>
                 <c:ext xmlns:c16="http://schemas.microsoft.com/office/drawing/2014/chart" uri="{C3380CC4-5D6E-409C-BE32-E72D297353CC}">
-                  <c16:uniqueId val="{00000000-9B68-054A-86DD-47481C5F2381}"/>
+                  <c16:uniqueId val="{00000000-7290-DC4F-BB3F-2748F6A3DBED}"/>
                 </c:ext>
               </c:extLst>
             </c:dLbl>
@@ -293,7 +293,7 @@
                   <a:bodyPr/>
                   <a:lstStyle/>
                   <a:p>
-                    <a:fld id="{18A4CD20-6E43-4E4A-9F3A-B2ED41C5166C}" type="CELLRANGE">
+                    <a:fld id="{ED9A7522-2A55-4540-B759-DDC3E8FA2CB6}" type="CELLRANGE">
                       <a:rPr lang="en-US"/>
                       <a:pPr/>
                       <a:t>[CELLRANGE]</a:t>
@@ -316,7 +316,7 @@
                   <c15:showDataLabelsRange val="1"/>
                 </c:ext>
                 <c:ext xmlns:c16="http://schemas.microsoft.com/office/drawing/2014/chart" uri="{C3380CC4-5D6E-409C-BE32-E72D297353CC}">
-                  <c16:uniqueId val="{00000001-9B68-054A-86DD-47481C5F2381}"/>
+                  <c16:uniqueId val="{00000001-7290-DC4F-BB3F-2748F6A3DBED}"/>
                 </c:ext>
               </c:extLst>
             </c:dLbl>
@@ -383,13 +383,13 @@
                 <c:formatCode>General</c:formatCode>
                 <c:ptCount val="3"/>
                 <c:pt idx="0">
-                  <c:v>0.4</c:v>
+                  <c:v>0.44</c:v>
                 </c:pt>
                 <c:pt idx="1">
-                  <c:v>0.85</c:v>
+                  <c:v>0.89</c:v>
                 </c:pt>
                 <c:pt idx="2">
-                  <c:v>1.35</c:v>
+                  <c:v>1.39</c:v>
                 </c:pt>
               </c:numCache>
             </c:numRef>
@@ -432,7 +432,7 @@
               </c15:datalabelsRange>
             </c:ext>
             <c:ext xmlns:c16="http://schemas.microsoft.com/office/drawing/2014/chart" uri="{C3380CC4-5D6E-409C-BE32-E72D297353CC}">
-              <c16:uniqueId val="{00000003-9B68-054A-86DD-47481C5F2381}"/>
+              <c16:uniqueId val="{00000003-7290-DC4F-BB3F-2748F6A3DBED}"/>
             </c:ext>
           </c:extLst>
         </c:ser>
@@ -471,13 +471,13 @@
                 <c:formatCode>General</c:formatCode>
                 <c:ptCount val="3"/>
                 <c:pt idx="0">
-                  <c:v>0.4</c:v>
+                  <c:v>0.44</c:v>
                 </c:pt>
                 <c:pt idx="1">
-                  <c:v>0.85</c:v>
+                  <c:v>0.89</c:v>
                 </c:pt>
                 <c:pt idx="2">
-                  <c:v>1.35</c:v>
+                  <c:v>1.39</c:v>
                 </c:pt>
               </c:numCache>
             </c:numRef>
@@ -503,7 +503,7 @@
           <c:smooth val="0"/>
           <c:extLst>
             <c:ext xmlns:c16="http://schemas.microsoft.com/office/drawing/2014/chart" uri="{C3380CC4-5D6E-409C-BE32-E72D297353CC}">
-              <c16:uniqueId val="{00000005-9B68-054A-86DD-47481C5F2381}"/>
+              <c16:uniqueId val="{00000005-7290-DC4F-BB3F-2748F6A3DBED}"/>
             </c:ext>
           </c:extLst>
         </c:ser>
@@ -544,10 +544,10 @@
                 <c:formatCode>General</c:formatCode>
                 <c:ptCount val="2"/>
                 <c:pt idx="0">
-                  <c:v>1.0429999999999999</c:v>
+                  <c:v>1.026</c:v>
                 </c:pt>
                 <c:pt idx="1">
-                  <c:v>0.32199999999999995</c:v>
+                  <c:v>0.35680000000000012</c:v>
                 </c:pt>
               </c:numCache>
             </c:numRef>
@@ -555,7 +555,7 @@
           <c:smooth val="0"/>
           <c:extLst>
             <c:ext xmlns:c16="http://schemas.microsoft.com/office/drawing/2014/chart" uri="{C3380CC4-5D6E-409C-BE32-E72D297353CC}">
-              <c16:uniqueId val="{00000006-9B68-054A-86DD-47481C5F2381}"/>
+              <c16:uniqueId val="{00000006-7290-DC4F-BB3F-2748F6A3DBED}"/>
             </c:ext>
           </c:extLst>
         </c:ser>
@@ -600,7 +600,7 @@
                   <c:v>1.35</c:v>
                 </c:pt>
                 <c:pt idx="1">
-                  <c:v>0.57750000000000012</c:v>
+                  <c:v>0.63300000000000012</c:v>
                 </c:pt>
               </c:numCache>
             </c:numRef>
@@ -608,7 +608,7 @@
           <c:smooth val="0"/>
           <c:extLst>
             <c:ext xmlns:c16="http://schemas.microsoft.com/office/drawing/2014/chart" uri="{C3380CC4-5D6E-409C-BE32-E72D297353CC}">
-              <c16:uniqueId val="{00000007-9B68-054A-86DD-47481C5F2381}"/>
+              <c16:uniqueId val="{00000007-7290-DC4F-BB3F-2748F6A3DBED}"/>
             </c:ext>
           </c:extLst>
         </c:ser>
@@ -653,7 +653,7 @@
                   <c:v>1.75</c:v>
                 </c:pt>
                 <c:pt idx="1">
-                  <c:v>0.97750000000000004</c:v>
+                  <c:v>1.0329999999999999</c:v>
                 </c:pt>
               </c:numCache>
             </c:numRef>
@@ -661,7 +661,7 @@
           <c:smooth val="0"/>
           <c:extLst>
             <c:ext xmlns:c16="http://schemas.microsoft.com/office/drawing/2014/chart" uri="{C3380CC4-5D6E-409C-BE32-E72D297353CC}">
-              <c16:uniqueId val="{00000008-9B68-054A-86DD-47481C5F2381}"/>
+              <c16:uniqueId val="{00000008-7290-DC4F-BB3F-2748F6A3DBED}"/>
             </c:ext>
           </c:extLst>
         </c:ser>
@@ -681,6 +681,28 @@
           <c:marker>
             <c:symbol val="none"/>
           </c:marker>
+          <c:dPt>
+            <c:idx val="1"/>
+            <c:marker>
+              <c:symbol val="none"/>
+            </c:marker>
+            <c:bubble3D val="0"/>
+            <c:spPr>
+              <a:ln w="25400" cap="rnd">
+                <a:solidFill>
+                  <a:srgbClr val="00B050"/>
+                </a:solidFill>
+                <a:prstDash val="sysDot"/>
+                <a:round/>
+              </a:ln>
+              <a:effectLst/>
+            </c:spPr>
+            <c:extLst>
+              <c:ext xmlns:c16="http://schemas.microsoft.com/office/drawing/2014/chart" uri="{C3380CC4-5D6E-409C-BE32-E72D297353CC}">
+                <c16:uniqueId val="{0000000A-7290-DC4F-BB3F-2748F6A3DBED}"/>
+              </c:ext>
+            </c:extLst>
+          </c:dPt>
           <c:xVal>
             <c:numRef>
               <c:f>Sheet1!$A$18:$A$19</c:f>
@@ -706,7 +728,7 @@
                   <c:v>2.42</c:v>
                 </c:pt>
                 <c:pt idx="1">
-                  <c:v>1.6475</c:v>
+                  <c:v>1.7029999999999998</c:v>
                 </c:pt>
               </c:numCache>
             </c:numRef>
@@ -714,7 +736,7 @@
           <c:smooth val="0"/>
           <c:extLst>
             <c:ext xmlns:c16="http://schemas.microsoft.com/office/drawing/2014/chart" uri="{C3380CC4-5D6E-409C-BE32-E72D297353CC}">
-              <c16:uniqueId val="{00000009-9B68-054A-86DD-47481C5F2381}"/>
+              <c16:uniqueId val="{0000000B-7290-DC4F-BB3F-2748F6A3DBED}"/>
             </c:ext>
           </c:extLst>
         </c:ser>
@@ -1488,12 +1510,12 @@
 <c:userShapes xmlns:c="http://schemas.openxmlformats.org/drawingml/2006/chart">
   <cdr:relSizeAnchor xmlns:cdr="http://schemas.openxmlformats.org/drawingml/2006/chartDrawing">
     <cdr:from>
-      <cdr:x>0.08745</cdr:x>
-      <cdr:y>0.55228</cdr:y>
+      <cdr:x>0.08835</cdr:x>
+      <cdr:y>0.55916</cdr:y>
     </cdr:from>
     <cdr:to>
-      <cdr:x>0.8025</cdr:x>
-      <cdr:y>0.88424</cdr:y>
+      <cdr:x>0.83747</cdr:x>
+      <cdr:y>0.88554</cdr:y>
     </cdr:to>
     <cdr:sp macro="" textlink="">
       <cdr:nvSpPr>
@@ -1508,8 +1530,8 @@
       </cdr:nvSpPr>
       <cdr:spPr>
         <a:xfrm xmlns:a="http://schemas.openxmlformats.org/drawingml/2006/main">
-          <a:off x="601763" y="2948832"/>
-          <a:ext cx="4920617" cy="1772462"/>
+          <a:off x="605366" y="2991791"/>
+          <a:ext cx="5132915" cy="1746250"/>
         </a:xfrm>
         <a:prstGeom xmlns:a="http://schemas.openxmlformats.org/drawingml/2006/main" prst="rtTriangle">
           <a:avLst/>
@@ -1639,11 +1661,11 @@
   <cdr:relSizeAnchor xmlns:cdr="http://schemas.openxmlformats.org/drawingml/2006/chartDrawing">
     <cdr:from>
       <cdr:x>0.66174</cdr:x>
-      <cdr:y>0.44398</cdr:y>
+      <cdr:y>0.45223</cdr:y>
     </cdr:from>
     <cdr:to>
       <cdr:x>0.97169</cdr:x>
-      <cdr:y>0.788</cdr:y>
+      <cdr:y>0.7945</cdr:y>
     </cdr:to>
     <cdr:sp macro="" textlink="">
       <cdr:nvSpPr>
@@ -1658,19 +1680,32 @@
       </cdr:nvSpPr>
       <cdr:spPr>
         <a:xfrm xmlns:a="http://schemas.openxmlformats.org/drawingml/2006/main">
-          <a:off x="4652462" y="2359120"/>
-          <a:ext cx="2179149" cy="1828023"/>
+          <a:off x="4533170" y="2389222"/>
+          <a:ext cx="2123275" cy="1808258"/>
         </a:xfrm>
         <a:prstGeom xmlns:a="http://schemas.openxmlformats.org/drawingml/2006/main" prst="rect">
           <a:avLst/>
         </a:prstGeom>
-        <a:solidFill xmlns:a="http://schemas.openxmlformats.org/drawingml/2006/main">
-          <a:schemeClr val="accent5">
-            <a:lumMod val="20000"/>
-            <a:lumOff val="80000"/>
-            <a:alpha val="90000"/>
-          </a:schemeClr>
-        </a:solidFill>
+        <a:gradFill xmlns:a="http://schemas.openxmlformats.org/drawingml/2006/main" flip="none" rotWithShape="1">
+          <a:gsLst>
+            <a:gs pos="96000">
+              <a:schemeClr val="bg1">
+                <a:alpha val="79000"/>
+              </a:schemeClr>
+            </a:gs>
+            <a:gs pos="43000">
+              <a:schemeClr val="accent1">
+                <a:lumMod val="30000"/>
+                <a:lumOff val="70000"/>
+                <a:alpha val="80000"/>
+              </a:schemeClr>
+            </a:gs>
+          </a:gsLst>
+          <a:path path="circle">
+            <a:fillToRect l="50000" t="50000" r="50000" b="50000"/>
+          </a:path>
+          <a:tileRect/>
+        </a:gradFill>
       </cdr:spPr>
       <cdr:txBody>
         <a:bodyPr xmlns:a="http://schemas.openxmlformats.org/drawingml/2006/main" vertOverflow="clip" horzOverflow="clip" wrap="square" rtlCol="0" anchor="ctr" anchorCtr="1">
@@ -1744,7 +1779,7 @@
         <a:p xmlns:a="http://schemas.openxmlformats.org/drawingml/2006/main">
           <a:pPr algn="ctr"/>
           <a:r>
-            <a:rPr lang="en-US" sz="2800" b="0" i="0">
+            <a:rPr lang="en-US" sz="2800" b="0" i="0" dirty="0">
               <a:solidFill>
                 <a:srgbClr val="0070C0"/>
               </a:solidFill>
@@ -1759,12 +1794,12 @@
   </cdr:relSizeAnchor>
   <cdr:relSizeAnchor xmlns:cdr="http://schemas.openxmlformats.org/drawingml/2006/chartDrawing">
     <cdr:from>
-      <cdr:x>0.09351</cdr:x>
-      <cdr:y>0.04456</cdr:y>
+      <cdr:x>0.08906</cdr:x>
+      <cdr:y>0.03252</cdr:y>
     </cdr:from>
     <cdr:to>
-      <cdr:x>0.76292</cdr:x>
-      <cdr:y>0.14303</cdr:y>
+      <cdr:x>0.80719</cdr:x>
+      <cdr:y>0.19952</cdr:y>
     </cdr:to>
     <cdr:sp macro="" textlink="">
       <cdr:nvSpPr>
@@ -1779,21 +1814,35 @@
       </cdr:nvSpPr>
       <cdr:spPr>
         <a:xfrm xmlns:a="http://schemas.openxmlformats.org/drawingml/2006/main">
-          <a:off x="657436" y="236780"/>
-          <a:ext cx="4706416" cy="523220"/>
+          <a:off x="610099" y="171802"/>
+          <a:ext cx="4919480" cy="882298"/>
         </a:xfrm>
         <a:prstGeom xmlns:a="http://schemas.openxmlformats.org/drawingml/2006/main" prst="rect">
           <a:avLst/>
         </a:prstGeom>
-        <a:solidFill xmlns:a="http://schemas.openxmlformats.org/drawingml/2006/main">
-          <a:srgbClr val="FFE4E4">
-            <a:alpha val="84000"/>
-          </a:srgbClr>
-        </a:solidFill>
+        <a:gradFill xmlns:a="http://schemas.openxmlformats.org/drawingml/2006/main" flip="none" rotWithShape="1">
+          <a:gsLst>
+            <a:gs pos="100000">
+              <a:schemeClr val="bg1">
+                <a:alpha val="79000"/>
+              </a:schemeClr>
+            </a:gs>
+            <a:gs pos="72000">
+              <a:srgbClr val="FFE2E3"/>
+            </a:gs>
+            <a:gs pos="15000">
+              <a:srgbClr val="FFC5C6">
+                <a:alpha val="74000"/>
+              </a:srgbClr>
+            </a:gs>
+          </a:gsLst>
+          <a:lin ang="5400000" scaled="1"/>
+          <a:tileRect/>
+        </a:gradFill>
       </cdr:spPr>
       <cdr:txBody>
         <a:bodyPr xmlns:a="http://schemas.openxmlformats.org/drawingml/2006/main" wrap="square" rtlCol="0" anchor="ctr" anchorCtr="1">
-          <a:spAutoFit/>
+          <a:noAutofit/>
         </a:bodyPr>
         <a:lstStyle xmlns:a="http://schemas.openxmlformats.org/drawingml/2006/main">
           <a:lvl1pPr marL="0" indent="0">
@@ -1878,12 +1927,12 @@
   </cdr:relSizeAnchor>
   <cdr:relSizeAnchor xmlns:cdr="http://schemas.openxmlformats.org/drawingml/2006/chartDrawing">
     <cdr:from>
-      <cdr:x>0.21225</cdr:x>
-      <cdr:y>0.35917</cdr:y>
+      <cdr:x>0.22206</cdr:x>
+      <cdr:y>0.36879</cdr:y>
     </cdr:from>
     <cdr:to>
-      <cdr:x>0.97207</cdr:x>
-      <cdr:y>0.46477</cdr:y>
+      <cdr:x>0.98188</cdr:x>
+      <cdr:y>0.47439</cdr:y>
     </cdr:to>
     <cdr:sp macro="" textlink="">
       <cdr:nvSpPr>
@@ -1898,8 +1947,8 @@
       </cdr:nvSpPr>
       <cdr:spPr>
         <a:xfrm xmlns:a="http://schemas.openxmlformats.org/drawingml/2006/main" rot="20640000">
-          <a:off x="1465494" y="1897587"/>
-          <a:ext cx="5246213" cy="557886"/>
+          <a:off x="1533227" y="1948367"/>
+          <a:ext cx="5246227" cy="557906"/>
         </a:xfrm>
         <a:prstGeom xmlns:a="http://schemas.openxmlformats.org/drawingml/2006/main" prst="rect">
           <a:avLst/>
@@ -1980,7 +2029,7 @@
         <a:p xmlns:a="http://schemas.openxmlformats.org/drawingml/2006/main">
           <a:pPr algn="ctr"/>
           <a:r>
-            <a:rPr lang="en-US" sz="2800" b="0" i="0" dirty="0">
+            <a:rPr lang="en-US" sz="2800" b="0" i="0">
               <a:solidFill>
                 <a:srgbClr val="FF0000"/>
               </a:solidFill>
@@ -2078,7 +2127,7 @@
           <a:p>
             <a:fld id="{E980178D-6E24-954B-A040-ADA0C4161A9B}" type="datetimeFigureOut">
               <a:rPr lang="en-US" smtClean="0"/>
-              <a:t>8/16/21</a:t>
+              <a:t>8/17/21</a:t>
             </a:fld>
             <a:endParaRPr lang="en-US"/>
           </a:p>
@@ -2096,8 +2145,8 @@
         </p:nvSpPr>
         <p:spPr>
           <a:xfrm>
-            <a:off x="425450" y="1143000"/>
-            <a:ext cx="6007100" cy="3086100"/>
+            <a:off x="563563" y="1143000"/>
+            <a:ext cx="5730875" cy="3086100"/>
           </a:xfrm>
           <a:prstGeom prst="rect">
             <a:avLst/>
@@ -2374,8 +2423,8 @@
         </p:nvSpPr>
         <p:spPr>
           <a:xfrm>
-            <a:off x="1264246" y="850086"/>
-            <a:ext cx="7585472" cy="1808386"/>
+            <a:off x="1205905" y="850086"/>
+            <a:ext cx="7235429" cy="1808386"/>
           </a:xfrm>
         </p:spPr>
         <p:txBody>
@@ -2406,8 +2455,8 @@
         </p:nvSpPr>
         <p:spPr>
           <a:xfrm>
-            <a:off x="1264246" y="2728210"/>
-            <a:ext cx="7585472" cy="1254086"/>
+            <a:off x="1205905" y="2728210"/>
+            <a:ext cx="7235429" cy="1254086"/>
           </a:xfrm>
         </p:spPr>
         <p:txBody>
@@ -2476,7 +2525,7 @@
           <a:p>
             <a:fld id="{9DADCADD-60A5-4D9C-8F98-0816108A28A8}" type="datetimeFigureOut">
               <a:rPr lang="en-CA" smtClean="0"/>
-              <a:t>2021-08-16</a:t>
+              <a:t>2021-08-17</a:t>
             </a:fld>
             <a:endParaRPr lang="en-CA"/>
           </a:p>
@@ -2527,7 +2576,7 @@
     </p:spTree>
     <p:extLst>
       <p:ext uri="{BB962C8B-B14F-4D97-AF65-F5344CB8AC3E}">
-        <p14:creationId xmlns:p14="http://schemas.microsoft.com/office/powerpoint/2010/main" val="587087220"/>
+        <p14:creationId xmlns:p14="http://schemas.microsoft.com/office/powerpoint/2010/main" val="2922367244"/>
       </p:ext>
     </p:extLst>
   </p:cSld>
@@ -2646,7 +2695,7 @@
           <a:p>
             <a:fld id="{9DADCADD-60A5-4D9C-8F98-0816108A28A8}" type="datetimeFigureOut">
               <a:rPr lang="en-CA" smtClean="0"/>
-              <a:t>2021-08-16</a:t>
+              <a:t>2021-08-17</a:t>
             </a:fld>
             <a:endParaRPr lang="en-CA"/>
           </a:p>
@@ -2697,7 +2746,7 @@
     </p:spTree>
     <p:extLst>
       <p:ext uri="{BB962C8B-B14F-4D97-AF65-F5344CB8AC3E}">
-        <p14:creationId xmlns:p14="http://schemas.microsoft.com/office/powerpoint/2010/main" val="3365018449"/>
+        <p14:creationId xmlns:p14="http://schemas.microsoft.com/office/powerpoint/2010/main" val="2595995327"/>
       </p:ext>
     </p:extLst>
   </p:cSld>
@@ -2736,8 +2785,8 @@
         </p:nvSpPr>
         <p:spPr>
           <a:xfrm>
-            <a:off x="7237805" y="276548"/>
-            <a:ext cx="2180823" cy="4401929"/>
+            <a:off x="6903805" y="276548"/>
+            <a:ext cx="2080186" cy="4401929"/>
           </a:xfrm>
         </p:spPr>
         <p:txBody>
@@ -2764,8 +2813,8 @@
         </p:nvSpPr>
         <p:spPr>
           <a:xfrm>
-            <a:off x="695335" y="276548"/>
-            <a:ext cx="6416045" cy="4401929"/>
+            <a:off x="663247" y="276548"/>
+            <a:ext cx="6119967" cy="4401929"/>
           </a:xfrm>
         </p:spPr>
         <p:txBody>
@@ -2826,7 +2875,7 @@
           <a:p>
             <a:fld id="{9DADCADD-60A5-4D9C-8F98-0816108A28A8}" type="datetimeFigureOut">
               <a:rPr lang="en-CA" smtClean="0"/>
-              <a:t>2021-08-16</a:t>
+              <a:t>2021-08-17</a:t>
             </a:fld>
             <a:endParaRPr lang="en-CA"/>
           </a:p>
@@ -2877,7 +2926,7 @@
     </p:spTree>
     <p:extLst>
       <p:ext uri="{BB962C8B-B14F-4D97-AF65-F5344CB8AC3E}">
-        <p14:creationId xmlns:p14="http://schemas.microsoft.com/office/powerpoint/2010/main" val="3575099856"/>
+        <p14:creationId xmlns:p14="http://schemas.microsoft.com/office/powerpoint/2010/main" val="1137887563"/>
       </p:ext>
     </p:extLst>
   </p:cSld>
@@ -2996,7 +3045,7 @@
           <a:p>
             <a:fld id="{9DADCADD-60A5-4D9C-8F98-0816108A28A8}" type="datetimeFigureOut">
               <a:rPr lang="en-CA" smtClean="0"/>
-              <a:t>2021-08-16</a:t>
+              <a:t>2021-08-17</a:t>
             </a:fld>
             <a:endParaRPr lang="en-CA"/>
           </a:p>
@@ -3047,7 +3096,7 @@
     </p:spTree>
     <p:extLst>
       <p:ext uri="{BB962C8B-B14F-4D97-AF65-F5344CB8AC3E}">
-        <p14:creationId xmlns:p14="http://schemas.microsoft.com/office/powerpoint/2010/main" val="3647843243"/>
+        <p14:creationId xmlns:p14="http://schemas.microsoft.com/office/powerpoint/2010/main" val="420874919"/>
       </p:ext>
     </p:extLst>
   </p:cSld>
@@ -3086,8 +3135,8 @@
         </p:nvSpPr>
         <p:spPr>
           <a:xfrm>
-            <a:off x="690067" y="1294969"/>
-            <a:ext cx="8723293" cy="2160684"/>
+            <a:off x="658223" y="1294969"/>
+            <a:ext cx="8320743" cy="2160684"/>
           </a:xfrm>
         </p:spPr>
         <p:txBody>
@@ -3118,8 +3167,8 @@
         </p:nvSpPr>
         <p:spPr>
           <a:xfrm>
-            <a:off x="690067" y="3476094"/>
-            <a:ext cx="8723293" cy="1136253"/>
+            <a:off x="658223" y="3476094"/>
+            <a:ext cx="8320743" cy="1136253"/>
           </a:xfrm>
         </p:spPr>
         <p:txBody>
@@ -3242,7 +3291,7 @@
           <a:p>
             <a:fld id="{9DADCADD-60A5-4D9C-8F98-0816108A28A8}" type="datetimeFigureOut">
               <a:rPr lang="en-CA" smtClean="0"/>
-              <a:t>2021-08-16</a:t>
+              <a:t>2021-08-17</a:t>
             </a:fld>
             <a:endParaRPr lang="en-CA"/>
           </a:p>
@@ -3293,7 +3342,7 @@
     </p:spTree>
     <p:extLst>
       <p:ext uri="{BB962C8B-B14F-4D97-AF65-F5344CB8AC3E}">
-        <p14:creationId xmlns:p14="http://schemas.microsoft.com/office/powerpoint/2010/main" val="3025557595"/>
+        <p14:creationId xmlns:p14="http://schemas.microsoft.com/office/powerpoint/2010/main" val="442839475"/>
       </p:ext>
     </p:extLst>
   </p:cSld>
@@ -3355,8 +3404,8 @@
         </p:nvSpPr>
         <p:spPr>
           <a:xfrm>
-            <a:off x="695335" y="1382742"/>
-            <a:ext cx="4298434" cy="3295736"/>
+            <a:off x="663248" y="1382742"/>
+            <a:ext cx="4100076" cy="3295736"/>
           </a:xfrm>
         </p:spPr>
         <p:txBody>
@@ -3412,8 +3461,8 @@
         </p:nvSpPr>
         <p:spPr>
           <a:xfrm>
-            <a:off x="5120194" y="1382742"/>
-            <a:ext cx="4298434" cy="3295736"/>
+            <a:off x="4883914" y="1382742"/>
+            <a:ext cx="4100076" cy="3295736"/>
           </a:xfrm>
         </p:spPr>
         <p:txBody>
@@ -3474,7 +3523,7 @@
           <a:p>
             <a:fld id="{9DADCADD-60A5-4D9C-8F98-0816108A28A8}" type="datetimeFigureOut">
               <a:rPr lang="en-CA" smtClean="0"/>
-              <a:t>2021-08-16</a:t>
+              <a:t>2021-08-17</a:t>
             </a:fld>
             <a:endParaRPr lang="en-CA"/>
           </a:p>
@@ -3525,7 +3574,7 @@
     </p:spTree>
     <p:extLst>
       <p:ext uri="{BB962C8B-B14F-4D97-AF65-F5344CB8AC3E}">
-        <p14:creationId xmlns:p14="http://schemas.microsoft.com/office/powerpoint/2010/main" val="1264536000"/>
+        <p14:creationId xmlns:p14="http://schemas.microsoft.com/office/powerpoint/2010/main" val="2654955888"/>
       </p:ext>
     </p:extLst>
   </p:cSld>
@@ -3564,8 +3613,8 @@
         </p:nvSpPr>
         <p:spPr>
           <a:xfrm>
-            <a:off x="696652" y="276549"/>
-            <a:ext cx="8723293" cy="1003991"/>
+            <a:off x="664504" y="276549"/>
+            <a:ext cx="8320743" cy="1003991"/>
           </a:xfrm>
         </p:spPr>
         <p:txBody>
@@ -3592,8 +3641,8 @@
         </p:nvSpPr>
         <p:spPr>
           <a:xfrm>
-            <a:off x="696653" y="1273325"/>
-            <a:ext cx="4278680" cy="624037"/>
+            <a:off x="664505" y="1273325"/>
+            <a:ext cx="4081233" cy="624037"/>
           </a:xfrm>
         </p:spPr>
         <p:txBody>
@@ -3657,8 +3706,8 @@
         </p:nvSpPr>
         <p:spPr>
           <a:xfrm>
-            <a:off x="696653" y="1897362"/>
-            <a:ext cx="4278680" cy="2790734"/>
+            <a:off x="664505" y="1897362"/>
+            <a:ext cx="4081233" cy="2790734"/>
           </a:xfrm>
         </p:spPr>
         <p:txBody>
@@ -3714,8 +3763,8 @@
         </p:nvSpPr>
         <p:spPr>
           <a:xfrm>
-            <a:off x="5120194" y="1273325"/>
-            <a:ext cx="4299752" cy="624037"/>
+            <a:off x="4883914" y="1273325"/>
+            <a:ext cx="4101333" cy="624037"/>
           </a:xfrm>
         </p:spPr>
         <p:txBody>
@@ -3779,8 +3828,8 @@
         </p:nvSpPr>
         <p:spPr>
           <a:xfrm>
-            <a:off x="5120194" y="1897362"/>
-            <a:ext cx="4299752" cy="2790734"/>
+            <a:off x="4883914" y="1897362"/>
+            <a:ext cx="4101333" cy="2790734"/>
           </a:xfrm>
         </p:spPr>
         <p:txBody>
@@ -3841,7 +3890,7 @@
           <a:p>
             <a:fld id="{9DADCADD-60A5-4D9C-8F98-0816108A28A8}" type="datetimeFigureOut">
               <a:rPr lang="en-CA" smtClean="0"/>
-              <a:t>2021-08-16</a:t>
+              <a:t>2021-08-17</a:t>
             </a:fld>
             <a:endParaRPr lang="en-CA"/>
           </a:p>
@@ -3892,7 +3941,7 @@
     </p:spTree>
     <p:extLst>
       <p:ext uri="{BB962C8B-B14F-4D97-AF65-F5344CB8AC3E}">
-        <p14:creationId xmlns:p14="http://schemas.microsoft.com/office/powerpoint/2010/main" val="2740324853"/>
+        <p14:creationId xmlns:p14="http://schemas.microsoft.com/office/powerpoint/2010/main" val="1074009851"/>
       </p:ext>
     </p:extLst>
   </p:cSld>
@@ -3959,7 +4008,7 @@
           <a:p>
             <a:fld id="{9DADCADD-60A5-4D9C-8F98-0816108A28A8}" type="datetimeFigureOut">
               <a:rPr lang="en-CA" smtClean="0"/>
-              <a:t>2021-08-16</a:t>
+              <a:t>2021-08-17</a:t>
             </a:fld>
             <a:endParaRPr lang="en-CA"/>
           </a:p>
@@ -4010,7 +4059,7 @@
     </p:spTree>
     <p:extLst>
       <p:ext uri="{BB962C8B-B14F-4D97-AF65-F5344CB8AC3E}">
-        <p14:creationId xmlns:p14="http://schemas.microsoft.com/office/powerpoint/2010/main" val="2444777745"/>
+        <p14:creationId xmlns:p14="http://schemas.microsoft.com/office/powerpoint/2010/main" val="1676685519"/>
       </p:ext>
     </p:extLst>
   </p:cSld>
@@ -4054,7 +4103,7 @@
           <a:p>
             <a:fld id="{9DADCADD-60A5-4D9C-8F98-0816108A28A8}" type="datetimeFigureOut">
               <a:rPr lang="en-CA" smtClean="0"/>
-              <a:t>2021-08-16</a:t>
+              <a:t>2021-08-17</a:t>
             </a:fld>
             <a:endParaRPr lang="en-CA"/>
           </a:p>
@@ -4105,7 +4154,7 @@
     </p:spTree>
     <p:extLst>
       <p:ext uri="{BB962C8B-B14F-4D97-AF65-F5344CB8AC3E}">
-        <p14:creationId xmlns:p14="http://schemas.microsoft.com/office/powerpoint/2010/main" val="621624770"/>
+        <p14:creationId xmlns:p14="http://schemas.microsoft.com/office/powerpoint/2010/main" val="937819562"/>
       </p:ext>
     </p:extLst>
   </p:cSld>
@@ -4144,8 +4193,8 @@
         </p:nvSpPr>
         <p:spPr>
           <a:xfrm>
-            <a:off x="696653" y="346287"/>
-            <a:ext cx="3262016" cy="1212003"/>
+            <a:off x="664505" y="346287"/>
+            <a:ext cx="3111485" cy="1212003"/>
           </a:xfrm>
         </p:spPr>
         <p:txBody>
@@ -4176,8 +4225,8 @@
         </p:nvSpPr>
         <p:spPr>
           <a:xfrm>
-            <a:off x="4299751" y="747883"/>
-            <a:ext cx="5120194" cy="3691320"/>
+            <a:off x="4101333" y="747883"/>
+            <a:ext cx="4883914" cy="3691320"/>
           </a:xfrm>
         </p:spPr>
         <p:txBody>
@@ -4261,8 +4310,8 @@
         </p:nvSpPr>
         <p:spPr>
           <a:xfrm>
-            <a:off x="696653" y="1558290"/>
-            <a:ext cx="3262016" cy="2886925"/>
+            <a:off x="664505" y="1558290"/>
+            <a:ext cx="3111485" cy="2886925"/>
           </a:xfrm>
         </p:spPr>
         <p:txBody>
@@ -4331,7 +4380,7 @@
           <a:p>
             <a:fld id="{9DADCADD-60A5-4D9C-8F98-0816108A28A8}" type="datetimeFigureOut">
               <a:rPr lang="en-CA" smtClean="0"/>
-              <a:t>2021-08-16</a:t>
+              <a:t>2021-08-17</a:t>
             </a:fld>
             <a:endParaRPr lang="en-CA"/>
           </a:p>
@@ -4382,7 +4431,7 @@
     </p:spTree>
     <p:extLst>
       <p:ext uri="{BB962C8B-B14F-4D97-AF65-F5344CB8AC3E}">
-        <p14:creationId xmlns:p14="http://schemas.microsoft.com/office/powerpoint/2010/main" val="1823457796"/>
+        <p14:creationId xmlns:p14="http://schemas.microsoft.com/office/powerpoint/2010/main" val="1921567251"/>
       </p:ext>
     </p:extLst>
   </p:cSld>
@@ -4421,8 +4470,8 @@
         </p:nvSpPr>
         <p:spPr>
           <a:xfrm>
-            <a:off x="696653" y="346287"/>
-            <a:ext cx="3262016" cy="1212003"/>
+            <a:off x="664505" y="346287"/>
+            <a:ext cx="3111485" cy="1212003"/>
           </a:xfrm>
         </p:spPr>
         <p:txBody>
@@ -4453,8 +4502,8 @@
         </p:nvSpPr>
         <p:spPr>
           <a:xfrm>
-            <a:off x="4299751" y="747883"/>
-            <a:ext cx="5120194" cy="3691320"/>
+            <a:off x="4101333" y="747883"/>
+            <a:ext cx="4883914" cy="3691320"/>
           </a:xfrm>
         </p:spPr>
         <p:txBody>
@@ -4518,8 +4567,8 @@
         </p:nvSpPr>
         <p:spPr>
           <a:xfrm>
-            <a:off x="696653" y="1558290"/>
-            <a:ext cx="3262016" cy="2886925"/>
+            <a:off x="664505" y="1558290"/>
+            <a:ext cx="3111485" cy="2886925"/>
           </a:xfrm>
         </p:spPr>
         <p:txBody>
@@ -4588,7 +4637,7 @@
           <a:p>
             <a:fld id="{9DADCADD-60A5-4D9C-8F98-0816108A28A8}" type="datetimeFigureOut">
               <a:rPr lang="en-CA" smtClean="0"/>
-              <a:t>2021-08-16</a:t>
+              <a:t>2021-08-17</a:t>
             </a:fld>
             <a:endParaRPr lang="en-CA"/>
           </a:p>
@@ -4639,7 +4688,7 @@
     </p:spTree>
     <p:extLst>
       <p:ext uri="{BB962C8B-B14F-4D97-AF65-F5344CB8AC3E}">
-        <p14:creationId xmlns:p14="http://schemas.microsoft.com/office/powerpoint/2010/main" val="1984880053"/>
+        <p14:creationId xmlns:p14="http://schemas.microsoft.com/office/powerpoint/2010/main" val="2819961975"/>
       </p:ext>
     </p:extLst>
   </p:cSld>
@@ -4683,8 +4732,8 @@
         </p:nvSpPr>
         <p:spPr>
           <a:xfrm>
-            <a:off x="695335" y="276549"/>
-            <a:ext cx="8723293" cy="1003991"/>
+            <a:off x="663248" y="276549"/>
+            <a:ext cx="8320743" cy="1003991"/>
           </a:xfrm>
           <a:prstGeom prst="rect">
             <a:avLst/>
@@ -4716,8 +4765,8 @@
         </p:nvSpPr>
         <p:spPr>
           <a:xfrm>
-            <a:off x="695335" y="1382742"/>
-            <a:ext cx="8723293" cy="3295736"/>
+            <a:off x="663248" y="1382742"/>
+            <a:ext cx="8320743" cy="3295736"/>
           </a:xfrm>
           <a:prstGeom prst="rect">
             <a:avLst/>
@@ -4778,8 +4827,8 @@
         </p:nvSpPr>
         <p:spPr>
           <a:xfrm>
-            <a:off x="695335" y="4814347"/>
-            <a:ext cx="2275642" cy="276548"/>
+            <a:off x="663247" y="4814347"/>
+            <a:ext cx="2170629" cy="276548"/>
           </a:xfrm>
           <a:prstGeom prst="rect">
             <a:avLst/>
@@ -4801,7 +4850,7 @@
           <a:p>
             <a:fld id="{9DADCADD-60A5-4D9C-8F98-0816108A28A8}" type="datetimeFigureOut">
               <a:rPr lang="en-CA" smtClean="0"/>
-              <a:t>2021-08-16</a:t>
+              <a:t>2021-08-17</a:t>
             </a:fld>
             <a:endParaRPr lang="en-CA"/>
           </a:p>
@@ -4819,8 +4868,8 @@
         </p:nvSpPr>
         <p:spPr>
           <a:xfrm>
-            <a:off x="3350250" y="4814347"/>
-            <a:ext cx="3413463" cy="276548"/>
+            <a:off x="3195648" y="4814347"/>
+            <a:ext cx="3255943" cy="276548"/>
           </a:xfrm>
           <a:prstGeom prst="rect">
             <a:avLst/>
@@ -4856,8 +4905,8 @@
         </p:nvSpPr>
         <p:spPr>
           <a:xfrm>
-            <a:off x="7142986" y="4814347"/>
-            <a:ext cx="2275642" cy="276548"/>
+            <a:off x="6813362" y="4814347"/>
+            <a:ext cx="2170629" cy="276548"/>
           </a:xfrm>
           <a:prstGeom prst="rect">
             <a:avLst/>
@@ -4888,23 +4937,23 @@
     </p:spTree>
     <p:extLst>
       <p:ext uri="{BB962C8B-B14F-4D97-AF65-F5344CB8AC3E}">
-        <p14:creationId xmlns:p14="http://schemas.microsoft.com/office/powerpoint/2010/main" val="1781457839"/>
+        <p14:creationId xmlns:p14="http://schemas.microsoft.com/office/powerpoint/2010/main" val="331689820"/>
       </p:ext>
     </p:extLst>
   </p:cSld>
   <p:clrMap bg1="lt1" tx1="dk1" bg2="lt2" tx2="dk2" accent1="accent1" accent2="accent2" accent3="accent3" accent4="accent4" accent5="accent5" accent6="accent6" hlink="hlink" folHlink="folHlink"/>
   <p:sldLayoutIdLst>
-    <p:sldLayoutId id="2147483685" r:id="rId1"/>
-    <p:sldLayoutId id="2147483686" r:id="rId2"/>
-    <p:sldLayoutId id="2147483687" r:id="rId3"/>
-    <p:sldLayoutId id="2147483688" r:id="rId4"/>
-    <p:sldLayoutId id="2147483689" r:id="rId5"/>
-    <p:sldLayoutId id="2147483690" r:id="rId6"/>
-    <p:sldLayoutId id="2147483691" r:id="rId7"/>
-    <p:sldLayoutId id="2147483692" r:id="rId8"/>
-    <p:sldLayoutId id="2147483693" r:id="rId9"/>
-    <p:sldLayoutId id="2147483694" r:id="rId10"/>
-    <p:sldLayoutId id="2147483695" r:id="rId11"/>
+    <p:sldLayoutId id="2147483697" r:id="rId1"/>
+    <p:sldLayoutId id="2147483698" r:id="rId2"/>
+    <p:sldLayoutId id="2147483699" r:id="rId3"/>
+    <p:sldLayoutId id="2147483700" r:id="rId4"/>
+    <p:sldLayoutId id="2147483701" r:id="rId5"/>
+    <p:sldLayoutId id="2147483702" r:id="rId6"/>
+    <p:sldLayoutId id="2147483703" r:id="rId7"/>
+    <p:sldLayoutId id="2147483704" r:id="rId8"/>
+    <p:sldLayoutId id="2147483705" r:id="rId9"/>
+    <p:sldLayoutId id="2147483706" r:id="rId10"/>
+    <p:sldLayoutId id="2147483707" r:id="rId11"/>
   </p:sldLayoutIdLst>
   <p:txStyles>
     <p:titleStyle>
@@ -5208,7 +5257,7 @@
       </p:grpSpPr>
       <p:graphicFrame>
         <p:nvGraphicFramePr>
-          <p:cNvPr id="6" name="Chart 5">
+          <p:cNvPr id="9" name="Chart 8">
             <a:extLst>
               <a:ext uri="{FF2B5EF4-FFF2-40B4-BE49-F238E27FC236}">
                 <a16:creationId xmlns:a16="http://schemas.microsoft.com/office/drawing/2014/main" id="{12D90FA0-E91E-604A-8333-D158845EE19D}"/>
@@ -5221,14 +5270,14 @@
           <p:nvPr>
             <p:extLst>
               <p:ext uri="{D42A27DB-BD31-4B8C-83A1-F6EECF244321}">
-                <p14:modId xmlns:p14="http://schemas.microsoft.com/office/powerpoint/2010/main" val="993369254"/>
+                <p14:modId xmlns:p14="http://schemas.microsoft.com/office/powerpoint/2010/main" val="2604707151"/>
               </p:ext>
             </p:extLst>
           </p:nvPr>
         </p:nvGraphicFramePr>
         <p:xfrm>
-          <a:off x="-95166" y="-40464"/>
-          <a:ext cx="7030649" cy="5313606"/>
+          <a:off x="-248601" y="-50800"/>
+          <a:ext cx="6850379" cy="5283200"/>
         </p:xfrm>
         <a:graphic>
           <a:graphicData uri="http://schemas.openxmlformats.org/drawingml/2006/chart">
@@ -5263,7 +5312,7 @@
         </p:blipFill>
         <p:spPr bwMode="auto">
           <a:xfrm>
-            <a:off x="7096472" y="4146680"/>
+            <a:off x="6672610" y="4146680"/>
             <a:ext cx="2880360" cy="914400"/>
           </a:xfrm>
           <a:prstGeom prst="rect">
@@ -5313,7 +5362,7 @@
         </p:blipFill>
         <p:spPr bwMode="auto">
           <a:xfrm>
-            <a:off x="7096472" y="2125241"/>
+            <a:off x="6672610" y="2125241"/>
             <a:ext cx="2880360" cy="914400"/>
           </a:xfrm>
           <a:prstGeom prst="rect">
@@ -5366,7 +5415,7 @@
         </p:blipFill>
         <p:spPr bwMode="auto">
           <a:xfrm>
-            <a:off x="7096472" y="3135961"/>
+            <a:off x="6672610" y="3135961"/>
             <a:ext cx="2880360" cy="914400"/>
           </a:xfrm>
           <a:prstGeom prst="rect">
@@ -5419,7 +5468,7 @@
         </p:blipFill>
         <p:spPr bwMode="auto">
           <a:xfrm>
-            <a:off x="7096472" y="1114521"/>
+            <a:off x="6672610" y="1114521"/>
             <a:ext cx="2880360" cy="914400"/>
           </a:xfrm>
           <a:prstGeom prst="rect">
@@ -5472,7 +5521,7 @@
         </p:blipFill>
         <p:spPr bwMode="auto">
           <a:xfrm>
-            <a:off x="7096472" y="103801"/>
+            <a:off x="6672610" y="103801"/>
             <a:ext cx="2880360" cy="914400"/>
           </a:xfrm>
           <a:prstGeom prst="rect">
@@ -5498,65 +5547,6 @@
           </a:extLst>
         </p:spPr>
       </p:pic>
-      <p:sp>
-        <p:nvSpPr>
-          <p:cNvPr id="7" name="Oval 6">
-            <a:extLst>
-              <a:ext uri="{FF2B5EF4-FFF2-40B4-BE49-F238E27FC236}">
-                <a16:creationId xmlns:a16="http://schemas.microsoft.com/office/drawing/2014/main" id="{1CBE8317-857D-F34E-8FD1-982C1EC0D5F7}"/>
-              </a:ext>
-            </a:extLst>
-          </p:cNvPr>
-          <p:cNvSpPr>
-            <a:spLocks noChangeAspect="1"/>
-          </p:cNvSpPr>
-          <p:nvPr/>
-        </p:nvSpPr>
-        <p:spPr>
-          <a:xfrm>
-            <a:off x="9315613" y="96386"/>
-            <a:ext cx="812486" cy="812486"/>
-          </a:xfrm>
-          <a:prstGeom prst="ellipse">
-            <a:avLst/>
-          </a:prstGeom>
-          <a:noFill/>
-          <a:ln>
-            <a:noFill/>
-          </a:ln>
-        </p:spPr>
-        <p:style>
-          <a:lnRef idx="2">
-            <a:schemeClr val="accent1">
-              <a:shade val="50000"/>
-            </a:schemeClr>
-          </a:lnRef>
-          <a:fillRef idx="1">
-            <a:schemeClr val="accent1"/>
-          </a:fillRef>
-          <a:effectRef idx="0">
-            <a:schemeClr val="accent1"/>
-          </a:effectRef>
-          <a:fontRef idx="minor">
-            <a:schemeClr val="lt1"/>
-          </a:fontRef>
-        </p:style>
-        <p:txBody>
-          <a:bodyPr rtlCol="0" anchor="ctr"/>
-          <a:lstStyle/>
-          <a:p>
-            <a:pPr algn="ctr"/>
-            <a:r>
-              <a:rPr lang="en-US" sz="2800" dirty="0">
-                <a:solidFill>
-                  <a:schemeClr val="tx1"/>
-                </a:solidFill>
-              </a:rPr>
-              <a:t>Cu</a:t>
-            </a:r>
-          </a:p>
-        </p:txBody>
-      </p:sp>
     </p:spTree>
     <p:extLst>
       <p:ext uri="{BB962C8B-B14F-4D97-AF65-F5344CB8AC3E}">

</xml_diff>